<commit_message>
Modificación del manual versión 1 de la aplicación
</commit_message>
<xml_diff>
--- a/web/Configuracion.pptx
+++ b/web/Configuracion.pptx
@@ -3695,7 +3695,7 @@
         <p:spPr>
           <a:xfrm>
             <a:off x="64872" y="967682"/>
-            <a:ext cx="9014255" cy="830997"/>
+            <a:ext cx="9014255" cy="738664"/>
           </a:xfrm>
           <a:prstGeom prst="rect">
             <a:avLst/>
@@ -3709,69 +3709,69 @@
           <a:lstStyle/>
           <a:p>
             <a:r>
-              <a:rPr lang="es-MX" sz="1600" dirty="0">
+              <a:rPr lang="es-MX" sz="1400" dirty="0">
                 <a:latin typeface="Arial" panose="020B0604020202020204" pitchFamily="34" charset="0"/>
                 <a:cs typeface="Arial" panose="020B0604020202020204" pitchFamily="34" charset="0"/>
               </a:rPr>
               <a:t>3. Después de haber ejecutado el archivo </a:t>
             </a:r>
             <a:r>
-              <a:rPr lang="es-MX" sz="1600" b="1" dirty="0" err="1">
+              <a:rPr lang="es-MX" sz="1400" b="1" dirty="0" err="1">
                 <a:latin typeface="Arial" panose="020B0604020202020204" pitchFamily="34" charset="0"/>
                 <a:cs typeface="Arial" panose="020B0604020202020204" pitchFamily="34" charset="0"/>
               </a:rPr>
               <a:t>ithuimanguillo.sql</a:t>
             </a:r>
             <a:r>
-              <a:rPr lang="es-MX" sz="1600" b="1" dirty="0">
+              <a:rPr lang="es-MX" sz="1400" b="1" dirty="0">
                 <a:latin typeface="Arial" panose="020B0604020202020204" pitchFamily="34" charset="0"/>
                 <a:cs typeface="Arial" panose="020B0604020202020204" pitchFamily="34" charset="0"/>
               </a:rPr>
               <a:t> </a:t>
             </a:r>
             <a:r>
-              <a:rPr lang="es-MX" sz="1600" dirty="0">
+              <a:rPr lang="es-MX" sz="1400" dirty="0">
                 <a:latin typeface="Arial" panose="020B0604020202020204" pitchFamily="34" charset="0"/>
                 <a:cs typeface="Arial" panose="020B0604020202020204" pitchFamily="34" charset="0"/>
               </a:rPr>
               <a:t>solo resta configurar el acceso a la base de datos desde el proyecto, para accederemos a la siguiente ruta dentro de la carpeta del proyecto </a:t>
             </a:r>
             <a:r>
-              <a:rPr lang="es-MX" sz="1600" b="1" dirty="0" err="1">
+              <a:rPr lang="es-MX" sz="1400" b="1" dirty="0" err="1">
                 <a:latin typeface="Arial" panose="020B0604020202020204" pitchFamily="34" charset="0"/>
                 <a:cs typeface="Arial" panose="020B0604020202020204" pitchFamily="34" charset="0"/>
               </a:rPr>
               <a:t>ithuimanguillo</a:t>
             </a:r>
             <a:r>
-              <a:rPr lang="es-MX" sz="1600" b="1" dirty="0">
+              <a:rPr lang="es-MX" sz="1400" b="1" dirty="0">
                 <a:latin typeface="Arial" panose="020B0604020202020204" pitchFamily="34" charset="0"/>
                 <a:cs typeface="Arial" panose="020B0604020202020204" pitchFamily="34" charset="0"/>
               </a:rPr>
               <a:t>/</a:t>
             </a:r>
             <a:r>
-              <a:rPr lang="es-MX" sz="1600" b="1" dirty="0" err="1">
+              <a:rPr lang="es-MX" sz="1400" b="1" dirty="0" err="1">
                 <a:latin typeface="Arial" panose="020B0604020202020204" pitchFamily="34" charset="0"/>
                 <a:cs typeface="Arial" panose="020B0604020202020204" pitchFamily="34" charset="0"/>
               </a:rPr>
               <a:t>config</a:t>
             </a:r>
             <a:r>
-              <a:rPr lang="es-MX" sz="1600" b="1" dirty="0">
+              <a:rPr lang="es-MX" sz="1400" b="1" dirty="0">
                 <a:latin typeface="Arial" panose="020B0604020202020204" pitchFamily="34" charset="0"/>
                 <a:cs typeface="Arial" panose="020B0604020202020204" pitchFamily="34" charset="0"/>
               </a:rPr>
               <a:t>/</a:t>
             </a:r>
             <a:r>
-              <a:rPr lang="es-MX" sz="1600" b="1" dirty="0" err="1">
+              <a:rPr lang="es-MX" sz="1400" b="1" dirty="0" err="1">
                 <a:latin typeface="Arial" panose="020B0604020202020204" pitchFamily="34" charset="0"/>
                 <a:cs typeface="Arial" panose="020B0604020202020204" pitchFamily="34" charset="0"/>
               </a:rPr>
               <a:t>db.php</a:t>
             </a:r>
-            <a:endParaRPr lang="es-MX" sz="1600" b="1" dirty="0">
+            <a:endParaRPr lang="es-MX" sz="1400" b="1" dirty="0">
               <a:latin typeface="Arial" panose="020B0604020202020204" pitchFamily="34" charset="0"/>
               <a:cs typeface="Arial" panose="020B0604020202020204" pitchFamily="34" charset="0"/>
             </a:endParaRPr>
@@ -3793,7 +3793,7 @@
         <p:spPr>
           <a:xfrm>
             <a:off x="186905" y="4677572"/>
-            <a:ext cx="9014255" cy="1908215"/>
+            <a:ext cx="9014255" cy="1600438"/>
           </a:xfrm>
           <a:prstGeom prst="rect">
             <a:avLst/>
@@ -3807,29 +3807,36 @@
           <a:lstStyle/>
           <a:p>
             <a:r>
-              <a:rPr lang="es-MX" sz="1600" dirty="0">
+              <a:rPr lang="es-MX" sz="1400" dirty="0">
                 <a:latin typeface="Arial" panose="020B0604020202020204" pitchFamily="34" charset="0"/>
                 <a:cs typeface="Arial" panose="020B0604020202020204" pitchFamily="34" charset="0"/>
               </a:rPr>
               <a:t>4. Una vez dentro del archivo </a:t>
             </a:r>
             <a:r>
-              <a:rPr lang="es-MX" sz="1600" dirty="0" err="1">
+              <a:rPr lang="es-MX" sz="1400" b="1" dirty="0" err="1">
                 <a:latin typeface="Arial" panose="020B0604020202020204" pitchFamily="34" charset="0"/>
                 <a:cs typeface="Arial" panose="020B0604020202020204" pitchFamily="34" charset="0"/>
               </a:rPr>
               <a:t>db.php</a:t>
             </a:r>
             <a:r>
-              <a:rPr lang="es-MX" sz="1600" dirty="0">
-                <a:latin typeface="Arial" panose="020B0604020202020204" pitchFamily="34" charset="0"/>
-                <a:cs typeface="Arial" panose="020B0604020202020204" pitchFamily="34" charset="0"/>
-              </a:rPr>
-              <a:t> solo resta colocar los datos correspondientes en las siguientes líneas:</a:t>
-            </a:r>
-          </a:p>
-          <a:p>
-            <a:endParaRPr lang="es-MX" sz="1600" dirty="0">
+              <a:rPr lang="es-MX" sz="1400" b="1" dirty="0">
+                <a:latin typeface="Arial" panose="020B0604020202020204" pitchFamily="34" charset="0"/>
+                <a:cs typeface="Arial" panose="020B0604020202020204" pitchFamily="34" charset="0"/>
+              </a:rPr>
+              <a:t> </a:t>
+            </a:r>
+            <a:r>
+              <a:rPr lang="es-MX" sz="1400" dirty="0">
+                <a:latin typeface="Arial" panose="020B0604020202020204" pitchFamily="34" charset="0"/>
+                <a:cs typeface="Arial" panose="020B0604020202020204" pitchFamily="34" charset="0"/>
+              </a:rPr>
+              <a:t>solo resta colocar los datos correspondientes en las siguientes líneas:</a:t>
+            </a:r>
+          </a:p>
+          <a:p>
+            <a:endParaRPr lang="es-MX" sz="1400" dirty="0">
               <a:latin typeface="Arial" panose="020B0604020202020204" pitchFamily="34" charset="0"/>
               <a:cs typeface="Arial" panose="020B0604020202020204" pitchFamily="34" charset="0"/>
             </a:endParaRPr>
@@ -4356,7 +4363,7 @@
         <p:spPr>
           <a:xfrm>
             <a:off x="360000" y="930166"/>
-            <a:ext cx="7885492" cy="338554"/>
+            <a:ext cx="6894836" cy="307777"/>
           </a:xfrm>
           <a:prstGeom prst="rect">
             <a:avLst/>
@@ -4370,35 +4377,35 @@
           <a:lstStyle/>
           <a:p>
             <a:r>
-              <a:rPr lang="es-MX" sz="1600" dirty="0">
+              <a:rPr lang="es-MX" sz="1400" dirty="0">
                 <a:latin typeface="Arial" panose="020B0604020202020204" pitchFamily="34" charset="0"/>
                 <a:cs typeface="Arial" panose="020B0604020202020204" pitchFamily="34" charset="0"/>
               </a:rPr>
               <a:t>1. Dirigirse a la carpeta </a:t>
             </a:r>
             <a:r>
-              <a:rPr lang="es-MX" sz="1600" b="1" dirty="0" err="1">
+              <a:rPr lang="es-MX" sz="1400" b="1" dirty="0" err="1">
                 <a:latin typeface="Arial" panose="020B0604020202020204" pitchFamily="34" charset="0"/>
                 <a:cs typeface="Arial" panose="020B0604020202020204" pitchFamily="34" charset="0"/>
               </a:rPr>
               <a:t>ithuimanguillo</a:t>
             </a:r>
             <a:r>
-              <a:rPr lang="es-MX" sz="1600" b="1" dirty="0">
+              <a:rPr lang="es-MX" sz="1400" b="1" dirty="0">
                 <a:latin typeface="Arial" panose="020B0604020202020204" pitchFamily="34" charset="0"/>
                 <a:cs typeface="Arial" panose="020B0604020202020204" pitchFamily="34" charset="0"/>
               </a:rPr>
               <a:t>/web/</a:t>
             </a:r>
             <a:r>
-              <a:rPr lang="es-MX" sz="1600" b="1" dirty="0" err="1">
+              <a:rPr lang="es-MX" sz="1400" b="1" dirty="0" err="1">
                 <a:latin typeface="Arial" panose="020B0604020202020204" pitchFamily="34" charset="0"/>
                 <a:cs typeface="Arial" panose="020B0604020202020204" pitchFamily="34" charset="0"/>
               </a:rPr>
               <a:t>fonts</a:t>
             </a:r>
             <a:r>
-              <a:rPr lang="es-MX" sz="1600" dirty="0">
+              <a:rPr lang="es-MX" sz="1400" dirty="0">
                 <a:latin typeface="Arial" panose="020B0604020202020204" pitchFamily="34" charset="0"/>
                 <a:cs typeface="Arial" panose="020B0604020202020204" pitchFamily="34" charset="0"/>
               </a:rPr>
@@ -4526,7 +4533,7 @@
         <p:spPr>
           <a:xfrm>
             <a:off x="360000" y="978190"/>
-            <a:ext cx="8424000" cy="584775"/>
+            <a:ext cx="8424000" cy="523220"/>
           </a:xfrm>
           <a:prstGeom prst="rect">
             <a:avLst/>
@@ -4540,77 +4547,77 @@
           <a:lstStyle/>
           <a:p>
             <a:r>
-              <a:rPr lang="es-MX" sz="1600" dirty="0">
+              <a:rPr lang="es-MX" sz="1400" dirty="0">
                 <a:latin typeface="Arial" panose="020B0604020202020204" pitchFamily="34" charset="0"/>
                 <a:cs typeface="Arial" panose="020B0604020202020204" pitchFamily="34" charset="0"/>
               </a:rPr>
               <a:t>2. Dirigirse a la carpeta </a:t>
             </a:r>
             <a:r>
-              <a:rPr lang="es-MX" sz="1600" b="1" dirty="0" err="1">
+              <a:rPr lang="es-MX" sz="1400" b="1" dirty="0" err="1">
                 <a:latin typeface="Arial" panose="020B0604020202020204" pitchFamily="34" charset="0"/>
                 <a:cs typeface="Arial" panose="020B0604020202020204" pitchFamily="34" charset="0"/>
               </a:rPr>
               <a:t>ithuimanguillo</a:t>
             </a:r>
             <a:r>
-              <a:rPr lang="es-MX" sz="1600" b="1" dirty="0">
+              <a:rPr lang="es-MX" sz="1400" b="1" dirty="0">
                 <a:latin typeface="Arial" panose="020B0604020202020204" pitchFamily="34" charset="0"/>
                 <a:cs typeface="Arial" panose="020B0604020202020204" pitchFamily="34" charset="0"/>
               </a:rPr>
               <a:t>/</a:t>
             </a:r>
             <a:r>
-              <a:rPr lang="es-MX" sz="1600" b="1" dirty="0" err="1">
+              <a:rPr lang="es-MX" sz="1400" b="1" dirty="0" err="1">
                 <a:latin typeface="Arial" panose="020B0604020202020204" pitchFamily="34" charset="0"/>
                 <a:cs typeface="Arial" panose="020B0604020202020204" pitchFamily="34" charset="0"/>
               </a:rPr>
               <a:t>vendor</a:t>
             </a:r>
             <a:r>
-              <a:rPr lang="es-MX" sz="1600" b="1" dirty="0">
+              <a:rPr lang="es-MX" sz="1400" b="1" dirty="0">
                 <a:latin typeface="Arial" panose="020B0604020202020204" pitchFamily="34" charset="0"/>
                 <a:cs typeface="Arial" panose="020B0604020202020204" pitchFamily="34" charset="0"/>
               </a:rPr>
               <a:t>/</a:t>
             </a:r>
             <a:r>
-              <a:rPr lang="es-MX" sz="1600" b="1" dirty="0" err="1">
+              <a:rPr lang="es-MX" sz="1400" b="1" dirty="0" err="1">
                 <a:latin typeface="Arial" panose="020B0604020202020204" pitchFamily="34" charset="0"/>
                 <a:cs typeface="Arial" panose="020B0604020202020204" pitchFamily="34" charset="0"/>
               </a:rPr>
               <a:t>setasign</a:t>
             </a:r>
             <a:r>
-              <a:rPr lang="es-MX" sz="1600" b="1" dirty="0">
+              <a:rPr lang="es-MX" sz="1400" b="1" dirty="0">
                 <a:latin typeface="Arial" panose="020B0604020202020204" pitchFamily="34" charset="0"/>
                 <a:cs typeface="Arial" panose="020B0604020202020204" pitchFamily="34" charset="0"/>
               </a:rPr>
               <a:t>/</a:t>
             </a:r>
             <a:r>
-              <a:rPr lang="es-MX" sz="1600" b="1" dirty="0" err="1">
+              <a:rPr lang="es-MX" sz="1400" b="1" dirty="0" err="1">
                 <a:latin typeface="Arial" panose="020B0604020202020204" pitchFamily="34" charset="0"/>
                 <a:cs typeface="Arial" panose="020B0604020202020204" pitchFamily="34" charset="0"/>
               </a:rPr>
               <a:t>fpdf</a:t>
             </a:r>
             <a:r>
-              <a:rPr lang="es-MX" sz="1600" b="1" dirty="0">
+              <a:rPr lang="es-MX" sz="1400" b="1" dirty="0">
                 <a:latin typeface="Arial" panose="020B0604020202020204" pitchFamily="34" charset="0"/>
                 <a:cs typeface="Arial" panose="020B0604020202020204" pitchFamily="34" charset="0"/>
               </a:rPr>
               <a:t>/</a:t>
             </a:r>
             <a:r>
-              <a:rPr lang="es-MX" sz="1600" b="1" dirty="0" err="1">
+              <a:rPr lang="es-MX" sz="1400" b="1" dirty="0" err="1">
                 <a:latin typeface="Arial" panose="020B0604020202020204" pitchFamily="34" charset="0"/>
                 <a:cs typeface="Arial" panose="020B0604020202020204" pitchFamily="34" charset="0"/>
               </a:rPr>
               <a:t>font</a:t>
             </a:r>
             <a:r>
-              <a:rPr lang="es-MX" sz="1600" dirty="0">
+              <a:rPr lang="es-MX" sz="1400" dirty="0">
                 <a:latin typeface="Arial" panose="020B0604020202020204" pitchFamily="34" charset="0"/>
                 <a:cs typeface="Arial" panose="020B0604020202020204" pitchFamily="34" charset="0"/>
               </a:rPr>
@@ -4731,7 +4738,7 @@
         <p:spPr>
           <a:xfrm>
             <a:off x="360000" y="978190"/>
-            <a:ext cx="8424000" cy="338554"/>
+            <a:ext cx="8424000" cy="307777"/>
           </a:xfrm>
           <a:prstGeom prst="rect">
             <a:avLst/>
@@ -4745,83 +4752,83 @@
           <a:lstStyle/>
           <a:p>
             <a:r>
-              <a:rPr lang="es-MX" sz="1600" dirty="0">
+              <a:rPr lang="es-MX" sz="1400" dirty="0">
                 <a:latin typeface="Arial" panose="020B0604020202020204" pitchFamily="34" charset="0"/>
                 <a:cs typeface="Arial" panose="020B0604020202020204" pitchFamily="34" charset="0"/>
               </a:rPr>
               <a:t>3. Dirigirse a la carpeta </a:t>
             </a:r>
             <a:r>
-              <a:rPr lang="es-MX" sz="1600" b="1" dirty="0" err="1">
+              <a:rPr lang="es-MX" sz="1400" b="1" dirty="0" err="1">
                 <a:latin typeface="Arial" panose="020B0604020202020204" pitchFamily="34" charset="0"/>
                 <a:cs typeface="Arial" panose="020B0604020202020204" pitchFamily="34" charset="0"/>
               </a:rPr>
               <a:t>ithuimanguillo</a:t>
             </a:r>
             <a:r>
-              <a:rPr lang="es-MX" sz="1600" b="1" dirty="0">
+              <a:rPr lang="es-MX" sz="1400" b="1" dirty="0">
                 <a:latin typeface="Arial" panose="020B0604020202020204" pitchFamily="34" charset="0"/>
                 <a:cs typeface="Arial" panose="020B0604020202020204" pitchFamily="34" charset="0"/>
               </a:rPr>
               <a:t>/</a:t>
             </a:r>
             <a:r>
-              <a:rPr lang="es-MX" sz="1600" b="1" dirty="0" err="1">
+              <a:rPr lang="es-MX" sz="1400" b="1" dirty="0" err="1">
                 <a:latin typeface="Arial" panose="020B0604020202020204" pitchFamily="34" charset="0"/>
                 <a:cs typeface="Arial" panose="020B0604020202020204" pitchFamily="34" charset="0"/>
               </a:rPr>
               <a:t>vendor</a:t>
             </a:r>
             <a:r>
-              <a:rPr lang="es-MX" sz="1600" b="1" dirty="0">
+              <a:rPr lang="es-MX" sz="1400" b="1" dirty="0">
                 <a:latin typeface="Arial" panose="020B0604020202020204" pitchFamily="34" charset="0"/>
                 <a:cs typeface="Arial" panose="020B0604020202020204" pitchFamily="34" charset="0"/>
               </a:rPr>
               <a:t>/</a:t>
             </a:r>
             <a:r>
-              <a:rPr lang="es-MX" sz="1600" b="1" dirty="0" err="1">
+              <a:rPr lang="es-MX" sz="1400" b="1" dirty="0" err="1">
                 <a:latin typeface="Arial" panose="020B0604020202020204" pitchFamily="34" charset="0"/>
                 <a:cs typeface="Arial" panose="020B0604020202020204" pitchFamily="34" charset="0"/>
               </a:rPr>
               <a:t>setasign</a:t>
             </a:r>
             <a:r>
-              <a:rPr lang="es-MX" sz="1600" b="1" dirty="0">
+              <a:rPr lang="es-MX" sz="1400" b="1" dirty="0">
                 <a:latin typeface="Arial" panose="020B0604020202020204" pitchFamily="34" charset="0"/>
                 <a:cs typeface="Arial" panose="020B0604020202020204" pitchFamily="34" charset="0"/>
               </a:rPr>
               <a:t>/</a:t>
             </a:r>
             <a:r>
-              <a:rPr lang="es-MX" sz="1600" b="1" dirty="0" err="1">
+              <a:rPr lang="es-MX" sz="1400" b="1" dirty="0" err="1">
                 <a:latin typeface="Arial" panose="020B0604020202020204" pitchFamily="34" charset="0"/>
                 <a:cs typeface="Arial" panose="020B0604020202020204" pitchFamily="34" charset="0"/>
               </a:rPr>
               <a:t>fpdf</a:t>
             </a:r>
             <a:r>
-              <a:rPr lang="es-MX" sz="1600" b="1" dirty="0">
+              <a:rPr lang="es-MX" sz="1400" b="1" dirty="0">
                 <a:latin typeface="Arial" panose="020B0604020202020204" pitchFamily="34" charset="0"/>
                 <a:cs typeface="Arial" panose="020B0604020202020204" pitchFamily="34" charset="0"/>
               </a:rPr>
               <a:t> </a:t>
             </a:r>
             <a:r>
-              <a:rPr lang="es-MX" sz="1600" dirty="0">
+              <a:rPr lang="es-MX" sz="1400" dirty="0">
                 <a:latin typeface="Arial" panose="020B0604020202020204" pitchFamily="34" charset="0"/>
                 <a:cs typeface="Arial" panose="020B0604020202020204" pitchFamily="34" charset="0"/>
               </a:rPr>
               <a:t>y abrir el archivo </a:t>
             </a:r>
             <a:r>
-              <a:rPr lang="es-MX" sz="1600" b="1" dirty="0" err="1">
+              <a:rPr lang="es-MX" sz="1400" b="1" dirty="0" err="1">
                 <a:latin typeface="Arial" panose="020B0604020202020204" pitchFamily="34" charset="0"/>
                 <a:cs typeface="Arial" panose="020B0604020202020204" pitchFamily="34" charset="0"/>
               </a:rPr>
               <a:t>fpdf.php</a:t>
             </a:r>
-            <a:endParaRPr lang="es-MX" sz="1600" b="1" dirty="0">
+            <a:endParaRPr lang="es-MX" sz="1400" b="1" dirty="0">
               <a:latin typeface="Arial" panose="020B0604020202020204" pitchFamily="34" charset="0"/>
               <a:cs typeface="Arial" panose="020B0604020202020204" pitchFamily="34" charset="0"/>
             </a:endParaRPr>
@@ -5028,8 +5035,8 @@
         </p:nvSpPr>
         <p:spPr>
           <a:xfrm>
-            <a:off x="558783" y="4810539"/>
-            <a:ext cx="8424000" cy="338554"/>
+            <a:off x="251791" y="4810539"/>
+            <a:ext cx="8424000" cy="307777"/>
           </a:xfrm>
           <a:prstGeom prst="rect">
             <a:avLst/>
@@ -5043,13 +5050,13 @@
           <a:lstStyle/>
           <a:p>
             <a:r>
-              <a:rPr lang="es-MX" sz="1600" dirty="0">
+              <a:rPr lang="es-MX" sz="1400" dirty="0">
                 <a:latin typeface="Arial" panose="020B0604020202020204" pitchFamily="34" charset="0"/>
                 <a:cs typeface="Arial" panose="020B0604020202020204" pitchFamily="34" charset="0"/>
               </a:rPr>
               <a:t>5. Guardar cambios en el archivo y cerrarlo.</a:t>
             </a:r>
-            <a:endParaRPr lang="es-MX" sz="1600" b="1" dirty="0">
+            <a:endParaRPr lang="es-MX" sz="1400" b="1" dirty="0">
               <a:latin typeface="Arial" panose="020B0604020202020204" pitchFamily="34" charset="0"/>
               <a:cs typeface="Arial" panose="020B0604020202020204" pitchFamily="34" charset="0"/>
             </a:endParaRPr>
@@ -5071,7 +5078,7 @@
         <p:spPr>
           <a:xfrm>
             <a:off x="251791" y="978190"/>
-            <a:ext cx="8730992" cy="584775"/>
+            <a:ext cx="8730992" cy="523220"/>
           </a:xfrm>
           <a:prstGeom prst="rect">
             <a:avLst/>
@@ -5085,62 +5092,62 @@
           <a:lstStyle/>
           <a:p>
             <a:r>
-              <a:rPr lang="es-MX" sz="1600" dirty="0">
+              <a:rPr lang="es-MX" sz="1400" dirty="0">
                 <a:latin typeface="Arial" panose="020B0604020202020204" pitchFamily="34" charset="0"/>
                 <a:cs typeface="Arial" panose="020B0604020202020204" pitchFamily="34" charset="0"/>
               </a:rPr>
               <a:t>4. Una vez abierto el archivo copia la siguiente línea </a:t>
             </a:r>
             <a:r>
-              <a:rPr lang="es-MX" sz="1600" b="1" dirty="0" err="1">
+              <a:rPr lang="es-MX" sz="1400" b="1" dirty="0" err="1">
                 <a:latin typeface="Arial" panose="020B0604020202020204" pitchFamily="34" charset="0"/>
                 <a:cs typeface="Arial" panose="020B0604020202020204" pitchFamily="34" charset="0"/>
               </a:rPr>
               <a:t>namespace</a:t>
             </a:r>
             <a:r>
-              <a:rPr lang="es-MX" sz="1600" b="1" dirty="0">
+              <a:rPr lang="es-MX" sz="1400" b="1" dirty="0">
                 <a:latin typeface="Arial" panose="020B0604020202020204" pitchFamily="34" charset="0"/>
                 <a:cs typeface="Arial" panose="020B0604020202020204" pitchFamily="34" charset="0"/>
               </a:rPr>
               <a:t> app\</a:t>
             </a:r>
             <a:r>
-              <a:rPr lang="es-MX" sz="1600" b="1" dirty="0" err="1">
+              <a:rPr lang="es-MX" sz="1400" b="1" dirty="0" err="1">
                 <a:latin typeface="Arial" panose="020B0604020202020204" pitchFamily="34" charset="0"/>
                 <a:cs typeface="Arial" panose="020B0604020202020204" pitchFamily="34" charset="0"/>
               </a:rPr>
               <a:t>vendor</a:t>
             </a:r>
             <a:r>
-              <a:rPr lang="es-MX" sz="1600" b="1" dirty="0">
+              <a:rPr lang="es-MX" sz="1400" b="1" dirty="0">
                 <a:latin typeface="Arial" panose="020B0604020202020204" pitchFamily="34" charset="0"/>
                 <a:cs typeface="Arial" panose="020B0604020202020204" pitchFamily="34" charset="0"/>
               </a:rPr>
               <a:t>\</a:t>
             </a:r>
             <a:r>
-              <a:rPr lang="es-MX" sz="1600" b="1" dirty="0" err="1">
+              <a:rPr lang="es-MX" sz="1400" b="1" dirty="0" err="1">
                 <a:latin typeface="Arial" panose="020B0604020202020204" pitchFamily="34" charset="0"/>
                 <a:cs typeface="Arial" panose="020B0604020202020204" pitchFamily="34" charset="0"/>
               </a:rPr>
               <a:t>setasign</a:t>
             </a:r>
             <a:r>
-              <a:rPr lang="es-MX" sz="1600" b="1" dirty="0">
+              <a:rPr lang="es-MX" sz="1400" b="1" dirty="0">
                 <a:latin typeface="Arial" panose="020B0604020202020204" pitchFamily="34" charset="0"/>
                 <a:cs typeface="Arial" panose="020B0604020202020204" pitchFamily="34" charset="0"/>
               </a:rPr>
               <a:t>\FPDF; </a:t>
             </a:r>
             <a:r>
-              <a:rPr lang="es-MX" sz="1600" dirty="0">
+              <a:rPr lang="es-MX" sz="1400" dirty="0">
                 <a:latin typeface="Arial" panose="020B0604020202020204" pitchFamily="34" charset="0"/>
                 <a:cs typeface="Arial" panose="020B0604020202020204" pitchFamily="34" charset="0"/>
               </a:rPr>
               <a:t>como se muestra en la imagen.</a:t>
             </a:r>
-            <a:endParaRPr lang="es-MX" sz="1600" b="1" dirty="0">
+            <a:endParaRPr lang="es-MX" sz="1400" b="1" dirty="0">
               <a:latin typeface="Arial" panose="020B0604020202020204" pitchFamily="34" charset="0"/>
               <a:cs typeface="Arial" panose="020B0604020202020204" pitchFamily="34" charset="0"/>
             </a:endParaRPr>
@@ -5329,7 +5336,7 @@
         <p:spPr>
           <a:xfrm>
             <a:off x="251791" y="1070092"/>
-            <a:ext cx="8876764" cy="584775"/>
+            <a:ext cx="8876764" cy="523220"/>
           </a:xfrm>
           <a:prstGeom prst="rect">
             <a:avLst/>
@@ -5343,28 +5350,28 @@
           <a:lstStyle/>
           <a:p>
             <a:r>
-              <a:rPr lang="es-MX" sz="1600" dirty="0">
+              <a:rPr lang="es-MX" sz="1400" dirty="0">
                 <a:latin typeface="Arial" panose="020B0604020202020204" pitchFamily="34" charset="0"/>
                 <a:cs typeface="Arial" panose="020B0604020202020204" pitchFamily="34" charset="0"/>
               </a:rPr>
               <a:t>1. Desde el navegador web de su preferencia acceder a la </a:t>
             </a:r>
             <a:r>
-              <a:rPr lang="es-MX" sz="1600" dirty="0" err="1">
+              <a:rPr lang="es-MX" sz="1400" dirty="0" err="1">
                 <a:latin typeface="Arial" panose="020B0604020202020204" pitchFamily="34" charset="0"/>
                 <a:cs typeface="Arial" panose="020B0604020202020204" pitchFamily="34" charset="0"/>
               </a:rPr>
               <a:t>url</a:t>
             </a:r>
             <a:r>
-              <a:rPr lang="es-MX" sz="1600" dirty="0">
+              <a:rPr lang="es-MX" sz="1400" dirty="0">
                 <a:latin typeface="Arial" panose="020B0604020202020204" pitchFamily="34" charset="0"/>
                 <a:cs typeface="Arial" panose="020B0604020202020204" pitchFamily="34" charset="0"/>
               </a:rPr>
               <a:t> el proyecto, en este caso </a:t>
             </a:r>
             <a:r>
-              <a:rPr lang="es-MX" sz="1600" b="1" dirty="0">
+              <a:rPr lang="es-MX" sz="1400" b="1" dirty="0">
                 <a:latin typeface="Arial" panose="020B0604020202020204" pitchFamily="34" charset="0"/>
                 <a:cs typeface="Arial" panose="020B0604020202020204" pitchFamily="34" charset="0"/>
               </a:rPr>
@@ -5492,7 +5499,7 @@
         <p:spPr>
           <a:xfrm>
             <a:off x="133618" y="968492"/>
-            <a:ext cx="8876764" cy="584775"/>
+            <a:ext cx="8876764" cy="523220"/>
           </a:xfrm>
           <a:prstGeom prst="rect">
             <a:avLst/>
@@ -5506,14 +5513,14 @@
           <a:lstStyle/>
           <a:p>
             <a:r>
-              <a:rPr lang="es-MX" sz="1600" dirty="0">
+              <a:rPr lang="es-MX" sz="1400" dirty="0">
                 <a:latin typeface="Arial" panose="020B0604020202020204" pitchFamily="34" charset="0"/>
                 <a:cs typeface="Arial" panose="020B0604020202020204" pitchFamily="34" charset="0"/>
               </a:rPr>
               <a:t>2. En este punto ya debería cargar el proyecto y en caso de ser así, procederemos a consultar los datos de un estudiante con su número de control, como ejemplo </a:t>
             </a:r>
             <a:r>
-              <a:rPr lang="es-MX" sz="1600" b="1" dirty="0">
+              <a:rPr lang="es-MX" sz="1400" b="1" dirty="0">
                 <a:latin typeface="Arial" panose="020B0604020202020204" pitchFamily="34" charset="0"/>
                 <a:cs typeface="Arial" panose="020B0604020202020204" pitchFamily="34" charset="0"/>
               </a:rPr>
@@ -5573,7 +5580,7 @@
         <p:spPr>
           <a:xfrm>
             <a:off x="133618" y="5597120"/>
-            <a:ext cx="8876764" cy="584775"/>
+            <a:ext cx="8876764" cy="523220"/>
           </a:xfrm>
           <a:prstGeom prst="rect">
             <a:avLst/>
@@ -5587,13 +5594,13 @@
           <a:lstStyle/>
           <a:p>
             <a:r>
-              <a:rPr lang="es-MX" sz="1600" dirty="0">
+              <a:rPr lang="es-MX" sz="1400" dirty="0">
                 <a:latin typeface="Arial" panose="020B0604020202020204" pitchFamily="34" charset="0"/>
                 <a:cs typeface="Arial" panose="020B0604020202020204" pitchFamily="34" charset="0"/>
               </a:rPr>
               <a:t>Como se puede ver en la imagen, al dar clic en el botón Buscar la información del estudiante se muestra correctamente y con ello la opción para descargar la boleta de calificaciones</a:t>
             </a:r>
-            <a:endParaRPr lang="es-MX" sz="1600" b="1" dirty="0">
+            <a:endParaRPr lang="es-MX" sz="1400" b="1" dirty="0">
               <a:latin typeface="Arial" panose="020B0604020202020204" pitchFamily="34" charset="0"/>
               <a:cs typeface="Arial" panose="020B0604020202020204" pitchFamily="34" charset="0"/>
             </a:endParaRPr>
@@ -5683,7 +5690,7 @@
         <p:spPr>
           <a:xfrm>
             <a:off x="133618" y="968492"/>
-            <a:ext cx="8876764" cy="584775"/>
+            <a:ext cx="8876764" cy="523220"/>
           </a:xfrm>
           <a:prstGeom prst="rect">
             <a:avLst/>
@@ -5697,13 +5704,13 @@
           <a:lstStyle/>
           <a:p>
             <a:r>
-              <a:rPr lang="es-MX" sz="1600" dirty="0">
+              <a:rPr lang="es-MX" sz="1400" dirty="0">
                 <a:latin typeface="Arial" panose="020B0604020202020204" pitchFamily="34" charset="0"/>
                 <a:cs typeface="Arial" panose="020B0604020202020204" pitchFamily="34" charset="0"/>
               </a:rPr>
               <a:t>3. Dar clic en el botón color verde Descargar para que podamos visualizar la boleta de calificaciones correspondiente al número de control consultado.</a:t>
             </a:r>
-            <a:endParaRPr lang="es-MX" sz="1600" b="1" dirty="0">
+            <a:endParaRPr lang="es-MX" sz="1400" b="1" dirty="0">
               <a:latin typeface="Arial" panose="020B0604020202020204" pitchFamily="34" charset="0"/>
               <a:cs typeface="Arial" panose="020B0604020202020204" pitchFamily="34" charset="0"/>
             </a:endParaRPr>
@@ -5761,7 +5768,7 @@
         <p:spPr>
           <a:xfrm>
             <a:off x="133618" y="5565892"/>
-            <a:ext cx="8876764" cy="584775"/>
+            <a:ext cx="8876764" cy="523220"/>
           </a:xfrm>
           <a:prstGeom prst="rect">
             <a:avLst/>
@@ -5775,7 +5782,7 @@
           <a:lstStyle/>
           <a:p>
             <a:r>
-              <a:rPr lang="es-MX" sz="1600" dirty="0">
+              <a:rPr lang="es-MX" sz="1400" dirty="0">
                 <a:latin typeface="Arial" panose="020B0604020202020204" pitchFamily="34" charset="0"/>
                 <a:cs typeface="Arial" panose="020B0604020202020204" pitchFamily="34" charset="0"/>
               </a:rPr>
@@ -6004,7 +6011,7 @@
         <p:spPr>
           <a:xfrm>
             <a:off x="133618" y="968492"/>
-            <a:ext cx="8876764" cy="584775"/>
+            <a:ext cx="8876764" cy="523220"/>
           </a:xfrm>
           <a:prstGeom prst="rect">
             <a:avLst/>
@@ -6018,13 +6025,13 @@
           <a:lstStyle/>
           <a:p>
             <a:r>
-              <a:rPr lang="es-MX" sz="1600" dirty="0">
+              <a:rPr lang="es-MX" sz="1400" dirty="0">
                 <a:latin typeface="Arial" panose="020B0604020202020204" pitchFamily="34" charset="0"/>
                 <a:cs typeface="Arial" panose="020B0604020202020204" pitchFamily="34" charset="0"/>
               </a:rPr>
               <a:t>Como se puede ver en la imagen, la boleta de calificaciones ha sido generada exitosamente con los datos correspondientes del estudiante consultado.</a:t>
             </a:r>
-            <a:endParaRPr lang="es-MX" sz="1600" b="1" dirty="0">
+            <a:endParaRPr lang="es-MX" sz="1400" b="1" dirty="0">
               <a:latin typeface="Arial" panose="020B0604020202020204" pitchFamily="34" charset="0"/>
               <a:cs typeface="Arial" panose="020B0604020202020204" pitchFamily="34" charset="0"/>
             </a:endParaRPr>
@@ -6502,7 +6509,7 @@
         <p:spPr>
           <a:xfrm>
             <a:off x="267236" y="1017946"/>
-            <a:ext cx="8504251" cy="1569660"/>
+            <a:ext cx="7479933" cy="1384995"/>
           </a:xfrm>
           <a:prstGeom prst="rect">
             <a:avLst/>
@@ -6519,7 +6526,7 @@
               <a:buAutoNum type="arabicPeriod"/>
             </a:pPr>
             <a:r>
-              <a:rPr lang="es-MX" sz="1600" dirty="0">
+              <a:rPr lang="es-MX" sz="1400" dirty="0">
                 <a:latin typeface="Arial" panose="020B0604020202020204" pitchFamily="34" charset="0"/>
                 <a:cs typeface="Arial" panose="020B0604020202020204" pitchFamily="34" charset="0"/>
               </a:rPr>
@@ -6531,7 +6538,7 @@
               <a:buAutoNum type="arabicPeriod"/>
             </a:pPr>
             <a:r>
-              <a:rPr lang="es-MX" sz="1600" dirty="0">
+              <a:rPr lang="es-MX" sz="1400" dirty="0">
                 <a:latin typeface="Arial" panose="020B0604020202020204" pitchFamily="34" charset="0"/>
                 <a:cs typeface="Arial" panose="020B0604020202020204" pitchFamily="34" charset="0"/>
               </a:rPr>
@@ -6543,7 +6550,7 @@
               <a:buAutoNum type="arabicPeriod"/>
             </a:pPr>
             <a:r>
-              <a:rPr lang="es-MX" sz="1600" dirty="0">
+              <a:rPr lang="es-MX" sz="1400" dirty="0">
                 <a:latin typeface="Arial" panose="020B0604020202020204" pitchFamily="34" charset="0"/>
                 <a:cs typeface="Arial" panose="020B0604020202020204" pitchFamily="34" charset="0"/>
               </a:rPr>
@@ -6555,13 +6562,13 @@
               <a:buAutoNum type="arabicPeriod"/>
             </a:pPr>
             <a:r>
-              <a:rPr lang="es-MX" sz="1600" dirty="0" err="1">
+              <a:rPr lang="es-MX" sz="1400" dirty="0" err="1">
                 <a:latin typeface="Arial" panose="020B0604020202020204" pitchFamily="34" charset="0"/>
                 <a:cs typeface="Arial" panose="020B0604020202020204" pitchFamily="34" charset="0"/>
               </a:rPr>
               <a:t>MariaDB</a:t>
             </a:r>
-            <a:endParaRPr lang="es-MX" sz="1600" dirty="0">
+            <a:endParaRPr lang="es-MX" sz="1400" dirty="0">
               <a:latin typeface="Arial" panose="020B0604020202020204" pitchFamily="34" charset="0"/>
               <a:cs typeface="Arial" panose="020B0604020202020204" pitchFamily="34" charset="0"/>
             </a:endParaRPr>
@@ -6571,13 +6578,13 @@
               <a:buAutoNum type="arabicPeriod"/>
             </a:pPr>
             <a:r>
-              <a:rPr lang="es-MX" sz="1600" dirty="0" err="1">
+              <a:rPr lang="es-MX" sz="1400" dirty="0" err="1">
                 <a:latin typeface="Arial" panose="020B0604020202020204" pitchFamily="34" charset="0"/>
                 <a:cs typeface="Arial" panose="020B0604020202020204" pitchFamily="34" charset="0"/>
               </a:rPr>
               <a:t>Composer</a:t>
             </a:r>
-            <a:endParaRPr lang="es-MX" sz="1600" dirty="0">
+            <a:endParaRPr lang="es-MX" sz="1400" dirty="0">
               <a:latin typeface="Arial" panose="020B0604020202020204" pitchFamily="34" charset="0"/>
               <a:cs typeface="Arial" panose="020B0604020202020204" pitchFamily="34" charset="0"/>
             </a:endParaRPr>
@@ -6587,7 +6594,7 @@
               <a:buAutoNum type="arabicPeriod"/>
             </a:pPr>
             <a:r>
-              <a:rPr lang="es-MX" sz="1600" dirty="0">
+              <a:rPr lang="es-MX" sz="1400" dirty="0">
                 <a:latin typeface="Arial" panose="020B0604020202020204" pitchFamily="34" charset="0"/>
                 <a:cs typeface="Arial" panose="020B0604020202020204" pitchFamily="34" charset="0"/>
               </a:rPr>
@@ -6610,8 +6617,8 @@
         </p:nvSpPr>
         <p:spPr>
           <a:xfrm>
-            <a:off x="267236" y="2632192"/>
-            <a:ext cx="8876764" cy="584775"/>
+            <a:off x="131674" y="2632192"/>
+            <a:ext cx="9012326" cy="523220"/>
           </a:xfrm>
           <a:prstGeom prst="rect">
             <a:avLst/>
@@ -6625,21 +6632,21 @@
           <a:lstStyle/>
           <a:p>
             <a:r>
-              <a:rPr lang="es-MX" sz="1600" dirty="0">
+              <a:rPr lang="es-MX" sz="1400" dirty="0">
                 <a:latin typeface="Arial" panose="020B0604020202020204" pitchFamily="34" charset="0"/>
                 <a:cs typeface="Arial" panose="020B0604020202020204" pitchFamily="34" charset="0"/>
               </a:rPr>
               <a:t>2. Con la ayuda del Git, clonar el repositorio </a:t>
             </a:r>
             <a:r>
-              <a:rPr lang="es-MX" sz="1600" b="1" dirty="0">
-                <a:latin typeface="Arial" panose="020B0604020202020204" pitchFamily="34" charset="0"/>
-                <a:cs typeface="Arial" panose="020B0604020202020204" pitchFamily="34" charset="0"/>
-              </a:rPr>
-              <a:t>https://github.com/jcgalvezocampo1985/ith.git</a:t>
-            </a:r>
-            <a:r>
-              <a:rPr lang="es-MX" sz="1600" dirty="0">
+              <a:rPr lang="es-MX" sz="1400" b="1" dirty="0">
+                <a:latin typeface="Arial" panose="020B0604020202020204" pitchFamily="34" charset="0"/>
+                <a:cs typeface="Arial" panose="020B0604020202020204" pitchFamily="34" charset="0"/>
+              </a:rPr>
+              <a:t>https://github.com/jcgalvezocampo1985/ithuimanguillo.git</a:t>
+            </a:r>
+            <a:r>
+              <a:rPr lang="es-MX" sz="1400" dirty="0">
                 <a:latin typeface="Arial" panose="020B0604020202020204" pitchFamily="34" charset="0"/>
                 <a:cs typeface="Arial" panose="020B0604020202020204" pitchFamily="34" charset="0"/>
               </a:rPr>
@@ -7040,8 +7047,8 @@
         </p:nvSpPr>
         <p:spPr>
           <a:xfrm>
-            <a:off x="64872" y="1070092"/>
-            <a:ext cx="9014255" cy="584775"/>
+            <a:off x="64872" y="916473"/>
+            <a:ext cx="9014255" cy="523220"/>
           </a:xfrm>
           <a:prstGeom prst="rect">
             <a:avLst/>
@@ -7058,21 +7065,21 @@
               <a:buAutoNum type="arabicPeriod"/>
             </a:pPr>
             <a:r>
-              <a:rPr lang="es-MX" sz="1600" dirty="0">
+              <a:rPr lang="es-MX" sz="1400" dirty="0">
                 <a:latin typeface="Arial" panose="020B0604020202020204" pitchFamily="34" charset="0"/>
                 <a:cs typeface="Arial" panose="020B0604020202020204" pitchFamily="34" charset="0"/>
               </a:rPr>
               <a:t>Con la ayuda de un administrador de base de datos de su preferencia, en este caso </a:t>
             </a:r>
             <a:r>
-              <a:rPr lang="es-MX" sz="1600" dirty="0" err="1">
+              <a:rPr lang="es-MX" sz="1400" dirty="0" err="1">
                 <a:latin typeface="Arial" panose="020B0604020202020204" pitchFamily="34" charset="0"/>
                 <a:cs typeface="Arial" panose="020B0604020202020204" pitchFamily="34" charset="0"/>
               </a:rPr>
               <a:t>Navicat</a:t>
             </a:r>
             <a:r>
-              <a:rPr lang="es-MX" sz="1600" dirty="0">
+              <a:rPr lang="es-MX" sz="1400" dirty="0">
                 <a:latin typeface="Arial" panose="020B0604020202020204" pitchFamily="34" charset="0"/>
                 <a:cs typeface="Arial" panose="020B0604020202020204" pitchFamily="34" charset="0"/>
               </a:rPr>
@@ -7199,8 +7206,8 @@
         </p:nvSpPr>
         <p:spPr>
           <a:xfrm>
-            <a:off x="64872" y="1070092"/>
-            <a:ext cx="9014255" cy="1077218"/>
+            <a:off x="129745" y="967679"/>
+            <a:ext cx="9014255" cy="738664"/>
           </a:xfrm>
           <a:prstGeom prst="rect">
             <a:avLst/>
@@ -7214,55 +7221,55 @@
           <a:lstStyle/>
           <a:p>
             <a:r>
-              <a:rPr lang="es-MX" sz="1600" dirty="0">
+              <a:rPr lang="es-MX" sz="1400" dirty="0">
                 <a:latin typeface="Arial" panose="020B0604020202020204" pitchFamily="34" charset="0"/>
                 <a:cs typeface="Arial" panose="020B0604020202020204" pitchFamily="34" charset="0"/>
               </a:rPr>
               <a:t>2. Una vez creada la base de datos, dentro de la carpeta del proyecto dirigirse a </a:t>
             </a:r>
             <a:r>
-              <a:rPr lang="es-MX" sz="1600" b="1" dirty="0" err="1">
+              <a:rPr lang="es-MX" sz="1400" b="1" dirty="0" err="1">
                 <a:latin typeface="Arial" panose="020B0604020202020204" pitchFamily="34" charset="0"/>
                 <a:cs typeface="Arial" panose="020B0604020202020204" pitchFamily="34" charset="0"/>
               </a:rPr>
               <a:t>ithuimanguillo</a:t>
             </a:r>
             <a:r>
-              <a:rPr lang="es-MX" sz="1600" b="1" dirty="0">
+              <a:rPr lang="es-MX" sz="1400" b="1" dirty="0">
                 <a:latin typeface="Arial" panose="020B0604020202020204" pitchFamily="34" charset="0"/>
                 <a:cs typeface="Arial" panose="020B0604020202020204" pitchFamily="34" charset="0"/>
               </a:rPr>
               <a:t>/web/BD, </a:t>
             </a:r>
             <a:r>
-              <a:rPr lang="es-MX" sz="1600" dirty="0">
+              <a:rPr lang="es-MX" sz="1400" dirty="0">
                 <a:latin typeface="Arial" panose="020B0604020202020204" pitchFamily="34" charset="0"/>
                 <a:cs typeface="Arial" panose="020B0604020202020204" pitchFamily="34" charset="0"/>
               </a:rPr>
               <a:t>en esta ruta se encuentra un archivo llamado </a:t>
             </a:r>
             <a:r>
-              <a:rPr lang="es-MX" sz="1600" b="1" dirty="0" err="1">
+              <a:rPr lang="es-MX" sz="1400" b="1" dirty="0" err="1">
                 <a:latin typeface="Arial" panose="020B0604020202020204" pitchFamily="34" charset="0"/>
                 <a:cs typeface="Arial" panose="020B0604020202020204" pitchFamily="34" charset="0"/>
               </a:rPr>
               <a:t>ithuimanguillo.sql</a:t>
             </a:r>
             <a:r>
-              <a:rPr lang="es-MX" sz="1600" b="1" dirty="0">
+              <a:rPr lang="es-MX" sz="1400" b="1" dirty="0">
                 <a:latin typeface="Arial" panose="020B0604020202020204" pitchFamily="34" charset="0"/>
                 <a:cs typeface="Arial" panose="020B0604020202020204" pitchFamily="34" charset="0"/>
               </a:rPr>
               <a:t>, </a:t>
             </a:r>
             <a:r>
-              <a:rPr lang="es-MX" sz="1600" dirty="0">
+              <a:rPr lang="es-MX" sz="1400" dirty="0">
                 <a:latin typeface="Arial" panose="020B0604020202020204" pitchFamily="34" charset="0"/>
                 <a:cs typeface="Arial" panose="020B0604020202020204" pitchFamily="34" charset="0"/>
               </a:rPr>
               <a:t>la cual contiene la estructura  e información de la base de datos del proyecto, importar el archivo la base de datos y ejecutarlo.</a:t>
             </a:r>
-            <a:endParaRPr lang="es-MX" sz="1600" b="1" dirty="0">
+            <a:endParaRPr lang="es-MX" sz="1400" b="1" dirty="0">
               <a:latin typeface="Arial" panose="020B0604020202020204" pitchFamily="34" charset="0"/>
               <a:cs typeface="Arial" panose="020B0604020202020204" pitchFamily="34" charset="0"/>
             </a:endParaRPr>

</xml_diff>

<commit_message>
Correción del manual version 1
</commit_message>
<xml_diff>
--- a/web/Configuracion.pptx
+++ b/web/Configuracion.pptx
@@ -5382,10 +5382,10 @@
       </p:sp>
       <p:pic>
         <p:nvPicPr>
-          <p:cNvPr id="9" name="Imagen 8">
+          <p:cNvPr id="3" name="Imagen 2">
             <a:extLst>
               <a:ext uri="{FF2B5EF4-FFF2-40B4-BE49-F238E27FC236}">
-                <a16:creationId xmlns:a16="http://schemas.microsoft.com/office/drawing/2014/main" id="{9C94AE8B-D50F-4E32-BFDF-56EB6AA569D8}"/>
+                <a16:creationId xmlns:a16="http://schemas.microsoft.com/office/drawing/2014/main" id="{3079E1FF-AFA3-43CB-9C58-9CF8092EA563}"/>
               </a:ext>
             </a:extLst>
           </p:cNvPr>
@@ -5396,13 +5396,13 @@
         </p:nvPicPr>
         <p:blipFill rotWithShape="1">
           <a:blip r:embed="rId2"/>
-          <a:srcRect t="11430"/>
+          <a:srcRect l="18960" t="7263" r="18240"/>
           <a:stretch/>
         </p:blipFill>
         <p:spPr>
           <a:xfrm>
-            <a:off x="571500" y="1803131"/>
-            <a:ext cx="7772400" cy="3668783"/>
+            <a:off x="1795419" y="1651840"/>
+            <a:ext cx="5553161" cy="4954369"/>
           </a:xfrm>
           <a:prstGeom prst="rect">
             <a:avLst/>
@@ -5529,42 +5529,6 @@
           </a:p>
         </p:txBody>
       </p:sp>
-      <p:pic>
-        <p:nvPicPr>
-          <p:cNvPr id="3" name="Imagen 2">
-            <a:extLst>
-              <a:ext uri="{FF2B5EF4-FFF2-40B4-BE49-F238E27FC236}">
-                <a16:creationId xmlns:a16="http://schemas.microsoft.com/office/drawing/2014/main" id="{4CBEAA3C-F8FD-4D9A-89D7-9D764B964D02}"/>
-              </a:ext>
-            </a:extLst>
-          </p:cNvPr>
-          <p:cNvPicPr>
-            <a:picLocks noChangeAspect="1"/>
-          </p:cNvPicPr>
-          <p:nvPr/>
-        </p:nvPicPr>
-        <p:blipFill rotWithShape="1">
-          <a:blip r:embed="rId2"/>
-          <a:srcRect t="10722" b="5286"/>
-          <a:stretch/>
-        </p:blipFill>
-        <p:spPr>
-          <a:xfrm>
-            <a:off x="468527" y="1670033"/>
-            <a:ext cx="8029145" cy="3791542"/>
-          </a:xfrm>
-          <a:prstGeom prst="rect">
-            <a:avLst/>
-          </a:prstGeom>
-          <a:ln>
-            <a:solidFill>
-              <a:schemeClr val="bg1">
-                <a:lumMod val="50000"/>
-              </a:schemeClr>
-            </a:solidFill>
-          </a:ln>
-        </p:spPr>
-      </p:pic>
       <p:sp>
         <p:nvSpPr>
           <p:cNvPr id="12" name="CuadroTexto 11">
@@ -5607,6 +5571,36 @@
           </a:p>
         </p:txBody>
       </p:sp>
+      <p:pic>
+        <p:nvPicPr>
+          <p:cNvPr id="5" name="Imagen 4">
+            <a:extLst>
+              <a:ext uri="{FF2B5EF4-FFF2-40B4-BE49-F238E27FC236}">
+                <a16:creationId xmlns:a16="http://schemas.microsoft.com/office/drawing/2014/main" id="{8B99EA28-D7A0-4A97-8F06-88ADE53A85C5}"/>
+              </a:ext>
+            </a:extLst>
+          </p:cNvPr>
+          <p:cNvPicPr>
+            <a:picLocks noChangeAspect="1"/>
+          </p:cNvPicPr>
+          <p:nvPr/>
+        </p:nvPicPr>
+        <p:blipFill>
+          <a:blip r:embed="rId2"/>
+          <a:stretch>
+            <a:fillRect/>
+          </a:stretch>
+        </p:blipFill>
+        <p:spPr>
+          <a:xfrm>
+            <a:off x="636422" y="1731947"/>
+            <a:ext cx="7871155" cy="3394105"/>
+          </a:xfrm>
+          <a:prstGeom prst="rect">
+            <a:avLst/>
+          </a:prstGeom>
+        </p:spPr>
+      </p:pic>
     </p:spTree>
     <p:extLst>
       <p:ext uri="{BB962C8B-B14F-4D97-AF65-F5344CB8AC3E}">
@@ -5717,42 +5711,6 @@
           </a:p>
         </p:txBody>
       </p:sp>
-      <p:pic>
-        <p:nvPicPr>
-          <p:cNvPr id="5" name="Imagen 4">
-            <a:extLst>
-              <a:ext uri="{FF2B5EF4-FFF2-40B4-BE49-F238E27FC236}">
-                <a16:creationId xmlns:a16="http://schemas.microsoft.com/office/drawing/2014/main" id="{195B0A4C-3383-4AD1-9BBE-7868E8BC3F1F}"/>
-              </a:ext>
-            </a:extLst>
-          </p:cNvPr>
-          <p:cNvPicPr>
-            <a:picLocks noChangeAspect="1"/>
-          </p:cNvPicPr>
-          <p:nvPr/>
-        </p:nvPicPr>
-        <p:blipFill rotWithShape="1">
-          <a:blip r:embed="rId2"/>
-          <a:srcRect t="10968" b="5287"/>
-          <a:stretch/>
-        </p:blipFill>
-        <p:spPr>
-          <a:xfrm>
-            <a:off x="546100" y="1737994"/>
-            <a:ext cx="7772400" cy="3659506"/>
-          </a:xfrm>
-          <a:prstGeom prst="rect">
-            <a:avLst/>
-          </a:prstGeom>
-          <a:ln>
-            <a:solidFill>
-              <a:schemeClr val="bg1">
-                <a:lumMod val="50000"/>
-              </a:schemeClr>
-            </a:solidFill>
-          </a:ln>
-        </p:spPr>
-      </p:pic>
       <p:sp>
         <p:nvSpPr>
           <p:cNvPr id="7" name="CuadroTexto 6">
@@ -5791,6 +5749,36 @@
           </a:p>
         </p:txBody>
       </p:sp>
+      <p:pic>
+        <p:nvPicPr>
+          <p:cNvPr id="3" name="Imagen 2">
+            <a:extLst>
+              <a:ext uri="{FF2B5EF4-FFF2-40B4-BE49-F238E27FC236}">
+                <a16:creationId xmlns:a16="http://schemas.microsoft.com/office/drawing/2014/main" id="{E554A29E-6F34-4277-9BB1-AF89A7A63DA0}"/>
+              </a:ext>
+            </a:extLst>
+          </p:cNvPr>
+          <p:cNvPicPr>
+            <a:picLocks noChangeAspect="1"/>
+          </p:cNvPicPr>
+          <p:nvPr/>
+        </p:nvPicPr>
+        <p:blipFill>
+          <a:blip r:embed="rId2"/>
+          <a:stretch>
+            <a:fillRect/>
+          </a:stretch>
+        </p:blipFill>
+        <p:spPr>
+          <a:xfrm>
+            <a:off x="1905609" y="1745052"/>
+            <a:ext cx="5332781" cy="3820840"/>
+          </a:xfrm>
+          <a:prstGeom prst="rect">
+            <a:avLst/>
+          </a:prstGeom>
+        </p:spPr>
+      </p:pic>
     </p:spTree>
     <p:extLst>
       <p:ext uri="{BB962C8B-B14F-4D97-AF65-F5344CB8AC3E}">
@@ -6040,10 +6028,10 @@
       </p:sp>
       <p:pic>
         <p:nvPicPr>
-          <p:cNvPr id="3" name="Imagen 2">
+          <p:cNvPr id="5" name="Imagen 4">
             <a:extLst>
               <a:ext uri="{FF2B5EF4-FFF2-40B4-BE49-F238E27FC236}">
-                <a16:creationId xmlns:a16="http://schemas.microsoft.com/office/drawing/2014/main" id="{70B65356-EFDF-4AD4-B291-4C74F4DA1447}"/>
+                <a16:creationId xmlns:a16="http://schemas.microsoft.com/office/drawing/2014/main" id="{987511B1-20FF-47A6-BA04-1FB60F6351E3}"/>
               </a:ext>
             </a:extLst>
           </p:cNvPr>
@@ -6060,19 +6048,12 @@
         </p:blipFill>
         <p:spPr>
           <a:xfrm>
-            <a:off x="736600" y="1705313"/>
-            <a:ext cx="7442200" cy="4184195"/>
-          </a:xfrm>
-          <a:prstGeom prst="rect">
-            <a:avLst/>
-          </a:prstGeom>
-          <a:ln>
-            <a:solidFill>
-              <a:schemeClr val="bg1">
-                <a:lumMod val="50000"/>
-              </a:schemeClr>
-            </a:solidFill>
-          </a:ln>
+            <a:off x="2889503" y="1704259"/>
+            <a:ext cx="3598487" cy="4766035"/>
+          </a:xfrm>
+          <a:prstGeom prst="rect">
+            <a:avLst/>
+          </a:prstGeom>
         </p:spPr>
       </p:pic>
     </p:spTree>

</xml_diff>